<commit_message>
add some optimization method again
</commit_message>
<xml_diff>
--- a/cuda_leaning.pptx
+++ b/cuda_leaning.pptx
@@ -13,6 +13,7 @@
     <p:sldId id="261" r:id="rId7"/>
     <p:sldId id="262" r:id="rId8"/>
     <p:sldId id="263" r:id="rId9"/>
+    <p:sldId id="264" r:id="rId10"/>
   </p:sldIdLst>
   <p:sldSz cx="12192000" cy="6858000"/>
   <p:notesSz cx="6858000" cy="9144000"/>
@@ -111,6 +112,11 @@
       </a:defRPr>
     </a:lvl9pPr>
   </p:defaultTextStyle>
+  <p:extLst>
+    <p:ext uri="{EFAFB233-063F-42B5-8137-9DF3F51BA10A}">
+      <p15:sldGuideLst xmlns:p15="http://schemas.microsoft.com/office/powerpoint/2012/main"/>
+    </p:ext>
+  </p:extLst>
 </p:presentation>
 </file>
 
@@ -159,7 +165,6 @@
               <a:rPr lang="en-US"/>
               <a:t>Click to edit Master title style</a:t>
             </a:r>
-            <a:endParaRPr lang="en-US"/>
           </a:p>
         </p:txBody>
       </p:sp>
@@ -224,7 +229,6 @@
               <a:rPr lang="en-US"/>
               <a:t>Click to edit Master subtitle style</a:t>
             </a:r>
-            <a:endParaRPr lang="en-US"/>
           </a:p>
         </p:txBody>
       </p:sp>
@@ -245,7 +249,7 @@
           <a:p>
             <a:fld id="{AEA7B2FA-034B-42BD-B0B0-05DB9876F433}" type="datetimeFigureOut">
               <a:rPr lang="en-US" smtClean="0"/>
-              <a:t>9/19/2017</a:t>
+              <a:t>9/20/2017</a:t>
             </a:fld>
             <a:endParaRPr lang="en-US"/>
           </a:p>
@@ -342,7 +346,6 @@
               <a:rPr lang="en-US"/>
               <a:t>Click to edit Master title style</a:t>
             </a:r>
-            <a:endParaRPr lang="en-US"/>
           </a:p>
         </p:txBody>
       </p:sp>
@@ -394,7 +397,6 @@
               <a:rPr lang="en-US"/>
               <a:t>Fifth level</a:t>
             </a:r>
-            <a:endParaRPr lang="en-US"/>
           </a:p>
         </p:txBody>
       </p:sp>
@@ -415,7 +417,7 @@
           <a:p>
             <a:fld id="{AEA7B2FA-034B-42BD-B0B0-05DB9876F433}" type="datetimeFigureOut">
               <a:rPr lang="en-US" smtClean="0"/>
-              <a:t>9/19/2017</a:t>
+              <a:t>9/20/2017</a:t>
             </a:fld>
             <a:endParaRPr lang="en-US"/>
           </a:p>
@@ -517,7 +519,6 @@
               <a:rPr lang="en-US"/>
               <a:t>Click to edit Master title style</a:t>
             </a:r>
-            <a:endParaRPr lang="en-US"/>
           </a:p>
         </p:txBody>
       </p:sp>
@@ -574,7 +575,6 @@
               <a:rPr lang="en-US"/>
               <a:t>Fifth level</a:t>
             </a:r>
-            <a:endParaRPr lang="en-US"/>
           </a:p>
         </p:txBody>
       </p:sp>
@@ -595,7 +595,7 @@
           <a:p>
             <a:fld id="{AEA7B2FA-034B-42BD-B0B0-05DB9876F433}" type="datetimeFigureOut">
               <a:rPr lang="en-US" smtClean="0"/>
-              <a:t>9/19/2017</a:t>
+              <a:t>9/20/2017</a:t>
             </a:fld>
             <a:endParaRPr lang="en-US"/>
           </a:p>
@@ -692,7 +692,6 @@
               <a:rPr lang="en-US"/>
               <a:t>Click to edit Master title style</a:t>
             </a:r>
-            <a:endParaRPr lang="en-US"/>
           </a:p>
         </p:txBody>
       </p:sp>
@@ -744,7 +743,6 @@
               <a:rPr lang="en-US"/>
               <a:t>Fifth level</a:t>
             </a:r>
-            <a:endParaRPr lang="en-US"/>
           </a:p>
         </p:txBody>
       </p:sp>
@@ -765,7 +763,7 @@
           <a:p>
             <a:fld id="{AEA7B2FA-034B-42BD-B0B0-05DB9876F433}" type="datetimeFigureOut">
               <a:rPr lang="en-US" smtClean="0"/>
-              <a:t>9/19/2017</a:t>
+              <a:t>9/20/2017</a:t>
             </a:fld>
             <a:endParaRPr lang="en-US"/>
           </a:p>
@@ -871,7 +869,6 @@
               <a:rPr lang="en-US"/>
               <a:t>Click to edit Master title style</a:t>
             </a:r>
-            <a:endParaRPr lang="en-US"/>
           </a:p>
         </p:txBody>
       </p:sp>
@@ -1011,7 +1008,7 @@
           <a:p>
             <a:fld id="{AEA7B2FA-034B-42BD-B0B0-05DB9876F433}" type="datetimeFigureOut">
               <a:rPr lang="en-US" smtClean="0"/>
-              <a:t>9/19/2017</a:t>
+              <a:t>9/20/2017</a:t>
             </a:fld>
             <a:endParaRPr lang="en-US"/>
           </a:p>
@@ -1108,7 +1105,6 @@
               <a:rPr lang="en-US"/>
               <a:t>Click to edit Master title style</a:t>
             </a:r>
-            <a:endParaRPr lang="en-US"/>
           </a:p>
         </p:txBody>
       </p:sp>
@@ -1165,7 +1161,6 @@
               <a:rPr lang="en-US"/>
               <a:t>Fifth level</a:t>
             </a:r>
-            <a:endParaRPr lang="en-US"/>
           </a:p>
         </p:txBody>
       </p:sp>
@@ -1222,7 +1217,6 @@
               <a:rPr lang="en-US"/>
               <a:t>Fifth level</a:t>
             </a:r>
-            <a:endParaRPr lang="en-US"/>
           </a:p>
         </p:txBody>
       </p:sp>
@@ -1243,7 +1237,7 @@
           <a:p>
             <a:fld id="{AEA7B2FA-034B-42BD-B0B0-05DB9876F433}" type="datetimeFigureOut">
               <a:rPr lang="en-US" smtClean="0"/>
-              <a:t>9/19/2017</a:t>
+              <a:t>9/20/2017</a:t>
             </a:fld>
             <a:endParaRPr lang="en-US"/>
           </a:p>
@@ -1345,7 +1339,6 @@
               <a:rPr lang="en-US"/>
               <a:t>Click to edit Master title style</a:t>
             </a:r>
-            <a:endParaRPr lang="en-US"/>
           </a:p>
         </p:txBody>
       </p:sp>
@@ -1467,7 +1460,6 @@
               <a:rPr lang="en-US"/>
               <a:t>Fifth level</a:t>
             </a:r>
-            <a:endParaRPr lang="en-US"/>
           </a:p>
         </p:txBody>
       </p:sp>
@@ -1589,7 +1581,6 @@
               <a:rPr lang="en-US"/>
               <a:t>Fifth level</a:t>
             </a:r>
-            <a:endParaRPr lang="en-US"/>
           </a:p>
         </p:txBody>
       </p:sp>
@@ -1610,7 +1601,7 @@
           <a:p>
             <a:fld id="{AEA7B2FA-034B-42BD-B0B0-05DB9876F433}" type="datetimeFigureOut">
               <a:rPr lang="en-US" smtClean="0"/>
-              <a:t>9/19/2017</a:t>
+              <a:t>9/20/2017</a:t>
             </a:fld>
             <a:endParaRPr lang="en-US"/>
           </a:p>
@@ -1707,7 +1698,6 @@
               <a:rPr lang="en-US"/>
               <a:t>Click to edit Master title style</a:t>
             </a:r>
-            <a:endParaRPr lang="en-US"/>
           </a:p>
         </p:txBody>
       </p:sp>
@@ -1728,7 +1718,7 @@
           <a:p>
             <a:fld id="{AEA7B2FA-034B-42BD-B0B0-05DB9876F433}" type="datetimeFigureOut">
               <a:rPr lang="en-US" smtClean="0"/>
-              <a:t>9/19/2017</a:t>
+              <a:t>9/20/2017</a:t>
             </a:fld>
             <a:endParaRPr lang="en-US"/>
           </a:p>
@@ -1823,7 +1813,7 @@
           <a:p>
             <a:fld id="{AEA7B2FA-034B-42BD-B0B0-05DB9876F433}" type="datetimeFigureOut">
               <a:rPr lang="en-US" smtClean="0"/>
-              <a:t>9/19/2017</a:t>
+              <a:t>9/20/2017</a:t>
             </a:fld>
             <a:endParaRPr lang="en-US"/>
           </a:p>
@@ -1929,7 +1919,6 @@
               <a:rPr lang="en-US"/>
               <a:t>Click to edit Master title style</a:t>
             </a:r>
-            <a:endParaRPr lang="en-US"/>
           </a:p>
         </p:txBody>
       </p:sp>
@@ -2014,7 +2003,6 @@
               <a:rPr lang="en-US"/>
               <a:t>Fifth level</a:t>
             </a:r>
-            <a:endParaRPr lang="en-US"/>
           </a:p>
         </p:txBody>
       </p:sp>
@@ -2100,7 +2088,7 @@
           <a:p>
             <a:fld id="{AEA7B2FA-034B-42BD-B0B0-05DB9876F433}" type="datetimeFigureOut">
               <a:rPr lang="en-US" smtClean="0"/>
-              <a:t>9/19/2017</a:t>
+              <a:t>9/20/2017</a:t>
             </a:fld>
             <a:endParaRPr lang="en-US"/>
           </a:p>
@@ -2206,7 +2194,6 @@
               <a:rPr lang="en-US"/>
               <a:t>Click to edit Master title style</a:t>
             </a:r>
-            <a:endParaRPr lang="en-US"/>
           </a:p>
         </p:txBody>
       </p:sp>
@@ -2353,7 +2340,7 @@
           <a:p>
             <a:fld id="{AEA7B2FA-034B-42BD-B0B0-05DB9876F433}" type="datetimeFigureOut">
               <a:rPr lang="en-US" smtClean="0"/>
-              <a:t>9/19/2017</a:t>
+              <a:t>9/20/2017</a:t>
             </a:fld>
             <a:endParaRPr lang="en-US"/>
           </a:p>
@@ -2465,7 +2452,6 @@
               <a:rPr lang="en-US"/>
               <a:t>Click to edit Master title style</a:t>
             </a:r>
-            <a:endParaRPr lang="en-US"/>
           </a:p>
         </p:txBody>
       </p:sp>
@@ -2527,7 +2513,6 @@
               <a:rPr lang="en-US"/>
               <a:t>Fifth level</a:t>
             </a:r>
-            <a:endParaRPr lang="en-US"/>
           </a:p>
         </p:txBody>
       </p:sp>
@@ -2566,7 +2551,7 @@
           <a:p>
             <a:fld id="{AEA7B2FA-034B-42BD-B0B0-05DB9876F433}" type="datetimeFigureOut">
               <a:rPr lang="en-US" smtClean="0"/>
-              <a:t>9/19/2017</a:t>
+              <a:t>9/20/2017</a:t>
             </a:fld>
             <a:endParaRPr lang="en-US"/>
           </a:p>
@@ -3056,7 +3041,7 @@
           <a:p>
             <a:r>
               <a:rPr lang="en-US" dirty="0"/>
-              <a:t>Memory coalescing</a:t>
+              <a:t>Global memory</a:t>
             </a:r>
           </a:p>
         </p:txBody>
@@ -3085,11 +3070,7 @@
           <a:p>
             <a:r>
               <a:rPr lang="en-US" dirty="0"/>
-              <a:t>A warp has 32 threads, </a:t>
-            </a:r>
-            <a:r>
-              <a:rPr lang="en-US" dirty="0"/>
-              <a:t>requesting 32bit/64bi/128bit</a:t>
+              <a:t>A warp has 32 threads, requesting 32bit/64bi/128bit</a:t>
             </a:r>
           </a:p>
           <a:p>
@@ -3475,7 +3456,6 @@
               <a:rPr lang="en-US" dirty="0"/>
               <a:t>, which can increase share memory bandwidth if you use 4-bytes data</a:t>
             </a:r>
-            <a:endParaRPr lang="en-US" dirty="0"/>
           </a:p>
         </p:txBody>
       </p:sp>
@@ -3660,7 +3640,7 @@
           <a:p>
             <a:r>
               <a:rPr lang="en-US" dirty="0"/>
-              <a:t>Use fast math if </a:t>
+              <a:t>Use built-in math lib, or fast math if </a:t>
             </a:r>
             <a:r>
               <a:rPr lang="en-US" altLang="zh-CN" dirty="0"/>
@@ -4088,7 +4068,82 @@
             </a:r>
             <a:r>
               <a:rPr lang="en-US" dirty="0"/>
-              <a:t> code.</a:t>
+              <a:t> code. Or use share memory.</a:t>
+            </a:r>
+          </a:p>
+          <a:p>
+            <a:r>
+              <a:rPr lang="en-US" dirty="0"/>
+              <a:t>If kernel function doesn’t use share memory, use API </a:t>
+            </a:r>
+            <a:r>
+              <a:rPr lang="en-US" dirty="0" err="1"/>
+              <a:t>cudaDeviceGetCacheConfig</a:t>
+            </a:r>
+            <a:r>
+              <a:rPr lang="en-US" dirty="0"/>
+              <a:t>, choose </a:t>
+            </a:r>
+            <a:r>
+              <a:rPr lang="en-US" dirty="0" err="1"/>
+              <a:t>enum</a:t>
+            </a:r>
+            <a:r>
+              <a:rPr lang="en-US" dirty="0"/>
+              <a:t> cudaFuncCachePreferL1,</a:t>
+            </a:r>
+          </a:p>
+          <a:p>
+            <a:pPr marL="0" indent="0">
+              <a:buNone/>
+            </a:pPr>
+            <a:r>
+              <a:rPr lang="en-US" dirty="0"/>
+              <a:t>   you’ll get a little improvement of performance.</a:t>
+            </a:r>
+          </a:p>
+          <a:p>
+            <a:endParaRPr lang="en-US" dirty="0"/>
+          </a:p>
+          <a:p>
+            <a:r>
+              <a:rPr lang="en-US" dirty="0"/>
+              <a:t>Use __align__ to align memory</a:t>
+            </a:r>
+          </a:p>
+          <a:p>
+            <a:pPr lvl="1"/>
+            <a:r>
+              <a:rPr lang="en-US" dirty="0"/>
+              <a:t>Tricks: struct __align__(16) </a:t>
+            </a:r>
+            <a:r>
+              <a:rPr lang="en-US" dirty="0" err="1"/>
+              <a:t>MyStruct</a:t>
+            </a:r>
+            <a:r>
+              <a:rPr lang="en-US" dirty="0"/>
+              <a:t> { float x, </a:t>
+            </a:r>
+            <a:r>
+              <a:rPr lang="en-US" dirty="0" err="1"/>
+              <a:t>int</a:t>
+            </a:r>
+            <a:r>
+              <a:rPr lang="en-US" dirty="0"/>
+              <a:t> y, float z, float w};</a:t>
+            </a:r>
+          </a:p>
+          <a:p>
+            <a:r>
+              <a:rPr lang="en-US" dirty="0"/>
+              <a:t>SOA(struct of array) to AOS(array of struct), reshape memory layout, store it to share memory</a:t>
+            </a:r>
+          </a:p>
+          <a:p>
+            <a:r>
+              <a:rPr lang="en-US" dirty="0"/>
+              <a:t>Make sure your kernel as simple as possible</a:t>
             </a:r>
           </a:p>
         </p:txBody>
@@ -4097,6 +4152,80 @@
     <p:extLst>
       <p:ext uri="{BB962C8B-B14F-4D97-AF65-F5344CB8AC3E}">
         <p14:creationId xmlns:p14="http://schemas.microsoft.com/office/powerpoint/2010/main" val="4074817516"/>
+      </p:ext>
+    </p:extLst>
+  </p:cSld>
+  <p:clrMapOvr>
+    <a:masterClrMapping/>
+  </p:clrMapOvr>
+</p:sld>
+</file>
+
+<file path=ppt/slides/slide9.xml><?xml version="1.0" encoding="utf-8"?>
+<p:sld xmlns:a="http://schemas.openxmlformats.org/drawingml/2006/main" xmlns:r="http://schemas.openxmlformats.org/officeDocument/2006/relationships" xmlns:p="http://schemas.openxmlformats.org/presentationml/2006/main">
+  <p:cSld>
+    <p:spTree>
+      <p:nvGrpSpPr>
+        <p:cNvPr id="1" name=""/>
+        <p:cNvGrpSpPr/>
+        <p:nvPr/>
+      </p:nvGrpSpPr>
+      <p:grpSpPr>
+        <a:xfrm>
+          <a:off x="0" y="0"/>
+          <a:ext cx="0" cy="0"/>
+          <a:chOff x="0" y="0"/>
+          <a:chExt cx="0" cy="0"/>
+        </a:xfrm>
+      </p:grpSpPr>
+      <p:sp>
+        <p:nvSpPr>
+          <p:cNvPr id="3" name="Content Placeholder 2"/>
+          <p:cNvSpPr>
+            <a:spLocks noGrp="1"/>
+          </p:cNvSpPr>
+          <p:nvPr>
+            <p:ph idx="1"/>
+          </p:nvPr>
+        </p:nvSpPr>
+        <p:spPr>
+          <a:xfrm>
+            <a:off x="838200" y="571500"/>
+            <a:ext cx="10515600" cy="5605463"/>
+          </a:xfrm>
+        </p:spPr>
+        <p:txBody>
+          <a:bodyPr/>
+          <a:lstStyle/>
+          <a:p>
+            <a:r>
+              <a:rPr lang="en-US" dirty="0"/>
+              <a:t>Use visual profiler to check instruction level, some issues will affect the performance of kernel, execution dependency, instruction fetch, synchronization, texture, </a:t>
+            </a:r>
+            <a:r>
+              <a:rPr lang="en-US" dirty="0" err="1"/>
+              <a:t>etc</a:t>
+            </a:r>
+            <a:endParaRPr lang="en-US" dirty="0"/>
+          </a:p>
+          <a:p>
+            <a:r>
+              <a:rPr lang="en-US" dirty="0"/>
+              <a:t>Do not use 1.0, which is double type, affecting performance a lot, use 1.0f</a:t>
+            </a:r>
+          </a:p>
+          <a:p>
+            <a:r>
+              <a:rPr lang="en-US" dirty="0"/>
+              <a:t>Tail effect</a:t>
+            </a:r>
+          </a:p>
+        </p:txBody>
+      </p:sp>
+    </p:spTree>
+    <p:extLst>
+      <p:ext uri="{BB962C8B-B14F-4D97-AF65-F5344CB8AC3E}">
+        <p14:creationId xmlns:p14="http://schemas.microsoft.com/office/powerpoint/2010/main" val="2221581680"/>
       </p:ext>
     </p:extLst>
   </p:cSld>

</xml_diff>